<commit_message>
Storyboard for paper #1
</commit_message>
<xml_diff>
--- a/sync_paper/Connection Length Effects on Propagation.pptx
+++ b/sync_paper/Connection Length Effects on Propagation.pptx
@@ -4311,10 +4311,92 @@
         </p:nvSpPr>
         <p:spPr/>
         <p:txBody>
-          <a:bodyPr/>
-          <a:lstStyle/>
+          <a:bodyPr>
+            <a:normAutofit fontScale="92500" lnSpcReduction="20000"/>
+          </a:bodyPr>
+          <a:lstStyle/>
+          <a:p>
+            <a:r>
+              <a:rPr lang="en-US" dirty="0"/>
+              <a:t>Exponential connectivity with increasing lambda</a:t>
+            </a:r>
+          </a:p>
+          <a:p>
+            <a:pPr lvl="1"/>
+            <a:r>
+              <a:rPr lang="en-US" dirty="0"/>
+              <a:t>Higher lambda makes fatter, faster waves</a:t>
+            </a:r>
+          </a:p>
+          <a:p>
+            <a:pPr lvl="1"/>
+            <a:r>
+              <a:rPr lang="en-US" dirty="0"/>
+              <a:t>At critical value we see re-firing</a:t>
+            </a:r>
+          </a:p>
+          <a:p>
+            <a:pPr lvl="1"/>
+            <a:r>
+              <a:rPr lang="en-US" dirty="0"/>
+              <a:t>Wave separation?</a:t>
+            </a:r>
+          </a:p>
+          <a:p>
+            <a:r>
+              <a:rPr lang="en-US" dirty="0"/>
+              <a:t>Normal connectivity</a:t>
+            </a:r>
+          </a:p>
+          <a:p>
+            <a:pPr lvl="1"/>
+            <a:r>
+              <a:rPr lang="en-US" dirty="0"/>
+              <a:t>Higher range connectivity makes fatter, faster waves</a:t>
+            </a:r>
+          </a:p>
+          <a:p>
+            <a:pPr lvl="1"/>
+            <a:r>
+              <a:rPr lang="en-US" dirty="0"/>
+              <a:t>At critical value we see re-firing</a:t>
+            </a:r>
+          </a:p>
+          <a:p>
+            <a:pPr lvl="1"/>
+            <a:r>
+              <a:rPr lang="en-US" dirty="0"/>
+              <a:t>Wave separation?</a:t>
+            </a:r>
+          </a:p>
           <a:p>
             <a:endParaRPr lang="en-US" dirty="0"/>
+          </a:p>
+          <a:p>
+            <a:r>
+              <a:rPr lang="en-US" dirty="0"/>
+              <a:t>Paper #1 – Narrative with figures</a:t>
+            </a:r>
+          </a:p>
+          <a:p>
+            <a:pPr lvl="1"/>
+            <a:r>
+              <a:rPr lang="en-US" dirty="0"/>
+              <a:t>Traveling waves in 1-D systems (2x2, 3x3)</a:t>
+            </a:r>
+          </a:p>
+          <a:p>
+            <a:pPr lvl="1"/>
+            <a:r>
+              <a:rPr lang="en-US" dirty="0"/>
+              <a:t>Behaviors by parameters: annihilation, echo, density/initiation correlation, phase space of connectivity/delay for velocity, delay behavior is normal, connectivity behavior</a:t>
+            </a:r>
+          </a:p>
+          <a:p>
+            <a:r>
+              <a:rPr lang="en-US" dirty="0"/>
+              <a:t>Paper #2: Column ensembles with Joe’s delta parameter</a:t>
+            </a:r>
           </a:p>
         </p:txBody>
       </p:sp>

</xml_diff>